<commit_message>
präsi finale version, doku
sorry tom, aber das was du gepusht hattest war echt zu unübersichtlich
für mich. habs jetz mal refactored. sollte so schöner sein :) (vorallem
is dieses hässliche buch layout weg)
</commit_message>
<xml_diff>
--- a/Abschluss-Praesentation/vorlage.pptx
+++ b/Abschluss-Praesentation/vorlage.pptx
@@ -17,7 +17,7 @@
     <p:sldId id="283" r:id="rId8"/>
     <p:sldId id="284" r:id="rId9"/>
     <p:sldId id="285" r:id="rId10"/>
-    <p:sldId id="287" r:id="rId11"/>
+    <p:sldId id="292" r:id="rId11"/>
     <p:sldId id="291" r:id="rId12"/>
   </p:sldIdLst>
   <p:sldSz cx="9144000" cy="6858000" type="screen4x3"/>
@@ -203,7 +203,7 @@
             <a:fld id="{3AF138D4-E06A-4D92-B176-75A0C7906805}" type="datetimeFigureOut">
               <a:rPr lang="de-DE" smtClean="0"/>
               <a:pPr/>
-              <a:t>12.07.2012</a:t>
+              <a:t>13.07.2012</a:t>
             </a:fld>
             <a:endParaRPr lang="de-DE"/>
           </a:p>
@@ -3763,46 +3763,7 @@
           <a:bodyPr/>
           <a:lstStyle/>
           <a:p>
-            <a:r>
-              <a:rPr lang="de-DE" dirty="0" smtClean="0"/>
-              <a:t>Ausblick - Integration</a:t>
-            </a:r>
-            <a:endParaRPr lang="de-DE" dirty="0"/>
-          </a:p>
-        </p:txBody>
-      </p:sp>
-      <p:sp>
-        <p:nvSpPr>
-          <p:cNvPr id="3" name="Inhaltsplatzhalter 2"/>
-          <p:cNvSpPr>
-            <a:spLocks noGrp="1"/>
-          </p:cNvSpPr>
-          <p:nvPr>
-            <p:ph idx="1"/>
-          </p:nvPr>
-        </p:nvSpPr>
-        <p:spPr/>
-        <p:txBody>
-          <a:bodyPr/>
-          <a:lstStyle/>
-          <a:p>
-            <a:r>
-              <a:rPr lang="de-DE" dirty="0" err="1" smtClean="0"/>
-              <a:t>CarMob</a:t>
-            </a:r>
-            <a:endParaRPr lang="de-DE" dirty="0" smtClean="0"/>
-          </a:p>
-          <a:p>
-            <a:pPr lvl="1"/>
-            <a:r>
-              <a:rPr lang="de-DE" dirty="0" smtClean="0"/>
-              <a:t>TODO </a:t>
-            </a:r>
-            <a:r>
-              <a:rPr lang="de-DE" dirty="0" err="1" smtClean="0"/>
-              <a:t>video</a:t>
-            </a:r>
-            <a:endParaRPr lang="de-DE" dirty="0"/>
+            <a:endParaRPr lang="de-DE"/>
           </a:p>
         </p:txBody>
       </p:sp>
@@ -3878,28 +3839,31 @@
       </p:sp>
       <p:pic>
         <p:nvPicPr>
-          <p:cNvPr id="7" name="Picture 2" descr="http://icons.iconarchive.com/icons/deleket/scrap/128/Magnifying-Glass-icon.png"/>
+          <p:cNvPr id="8" name="gource-slow.avi">
+            <a:hlinkClick r:id="" action="ppaction://media"/>
+          </p:cNvPr>
           <p:cNvPicPr>
-            <a:picLocks noChangeAspect="1" noChangeArrowheads="1"/>
+            <a:picLocks noGrp="1" noRot="1" noChangeAspect="1"/>
           </p:cNvPicPr>
-          <p:nvPr/>
+          <p:nvPr>
+            <p:ph idx="1"/>
+            <a:videoFile r:link="rId1"/>
+          </p:nvPr>
         </p:nvPicPr>
         <p:blipFill>
-          <a:blip r:embed="rId2" cstate="print"/>
-          <a:srcRect/>
+          <a:blip r:embed="rId3" cstate="print"/>
           <a:stretch>
             <a:fillRect/>
           </a:stretch>
         </p:blipFill>
-        <p:spPr bwMode="auto">
+        <p:spPr>
           <a:xfrm>
-            <a:off x="7596336" y="5229200"/>
-            <a:ext cx="1219200" cy="1219201"/>
+            <a:off x="131507" y="908720"/>
+            <a:ext cx="8832981" cy="4968552"/>
           </a:xfrm>
           <a:prstGeom prst="rect">
             <a:avLst/>
           </a:prstGeom>
-          <a:noFill/>
         </p:spPr>
       </p:pic>
     </p:spTree>
@@ -3910,7 +3874,150 @@
   <p:timing>
     <p:tnLst>
       <p:par>
-        <p:cTn id="1" dur="indefinite" restart="never" nodeType="tmRoot"/>
+        <p:cTn id="1" dur="indefinite" restart="never" nodeType="tmRoot">
+          <p:childTnLst>
+            <p:seq concurrent="1" nextAc="seek">
+              <p:cTn id="2" dur="indefinite" nodeType="mainSeq">
+                <p:childTnLst>
+                  <p:par>
+                    <p:cTn id="3" fill="hold">
+                      <p:stCondLst>
+                        <p:cond delay="indefinite"/>
+                        <p:cond evt="onBegin" delay="0">
+                          <p:tn val="2"/>
+                        </p:cond>
+                      </p:stCondLst>
+                      <p:childTnLst>
+                        <p:par>
+                          <p:cTn id="4" fill="hold">
+                            <p:stCondLst>
+                              <p:cond delay="0"/>
+                            </p:stCondLst>
+                            <p:childTnLst>
+                              <p:par>
+                                <p:cTn id="5" presetID="1" presetClass="mediacall" presetSubtype="0" fill="hold" nodeType="afterEffect">
+                                  <p:stCondLst>
+                                    <p:cond delay="0"/>
+                                  </p:stCondLst>
+                                  <p:childTnLst>
+                                    <p:cmd type="call" cmd="playFrom(0.0)">
+                                      <p:cBhvr>
+                                        <p:cTn id="6" dur="58866" fill="hold"/>
+                                        <p:tgtEl>
+                                          <p:spTgt spid="8"/>
+                                        </p:tgtEl>
+                                      </p:cBhvr>
+                                    </p:cmd>
+                                  </p:childTnLst>
+                                </p:cTn>
+                              </p:par>
+                            </p:childTnLst>
+                          </p:cTn>
+                        </p:par>
+                      </p:childTnLst>
+                    </p:cTn>
+                  </p:par>
+                </p:childTnLst>
+              </p:cTn>
+              <p:prevCondLst>
+                <p:cond evt="onPrev" delay="0">
+                  <p:tgtEl>
+                    <p:sldTgt/>
+                  </p:tgtEl>
+                </p:cond>
+              </p:prevCondLst>
+              <p:nextCondLst>
+                <p:cond evt="onNext" delay="0">
+                  <p:tgtEl>
+                    <p:sldTgt/>
+                  </p:tgtEl>
+                </p:cond>
+              </p:nextCondLst>
+            </p:seq>
+            <p:video>
+              <p:cMediaNode>
+                <p:cTn id="7" fill="hold" display="0">
+                  <p:stCondLst>
+                    <p:cond delay="indefinite"/>
+                  </p:stCondLst>
+                  <p:endCondLst>
+                    <p:cond evt="onNext" delay="0">
+                      <p:tgtEl>
+                        <p:sldTgt/>
+                      </p:tgtEl>
+                    </p:cond>
+                    <p:cond evt="onPrev" delay="0">
+                      <p:tgtEl>
+                        <p:sldTgt/>
+                      </p:tgtEl>
+                    </p:cond>
+                  </p:endCondLst>
+                </p:cTn>
+                <p:tgtEl>
+                  <p:spTgt spid="8"/>
+                </p:tgtEl>
+              </p:cMediaNode>
+            </p:video>
+            <p:seq concurrent="1" nextAc="seek">
+              <p:cTn id="8" restart="whenNotActive" fill="hold" evtFilter="cancelBubble" nodeType="interactiveSeq">
+                <p:stCondLst>
+                  <p:cond evt="onClick" delay="0">
+                    <p:tgtEl>
+                      <p:spTgt spid="8"/>
+                    </p:tgtEl>
+                  </p:cond>
+                </p:stCondLst>
+                <p:endSync evt="end" delay="0">
+                  <p:rtn val="all"/>
+                </p:endSync>
+                <p:childTnLst>
+                  <p:par>
+                    <p:cTn id="9" fill="hold">
+                      <p:stCondLst>
+                        <p:cond delay="0"/>
+                      </p:stCondLst>
+                      <p:childTnLst>
+                        <p:par>
+                          <p:cTn id="10" fill="hold">
+                            <p:stCondLst>
+                              <p:cond delay="0"/>
+                            </p:stCondLst>
+                            <p:childTnLst>
+                              <p:par>
+                                <p:cTn id="11" presetID="2" presetClass="mediacall" presetSubtype="0" fill="hold" nodeType="clickEffect">
+                                  <p:stCondLst>
+                                    <p:cond delay="0"/>
+                                  </p:stCondLst>
+                                  <p:childTnLst>
+                                    <p:cmd type="call" cmd="togglePause">
+                                      <p:cBhvr>
+                                        <p:cTn id="12" dur="1" fill="hold"/>
+                                        <p:tgtEl>
+                                          <p:spTgt spid="8"/>
+                                        </p:tgtEl>
+                                      </p:cBhvr>
+                                    </p:cmd>
+                                  </p:childTnLst>
+                                </p:cTn>
+                              </p:par>
+                            </p:childTnLst>
+                          </p:cTn>
+                        </p:par>
+                      </p:childTnLst>
+                    </p:cTn>
+                  </p:par>
+                </p:childTnLst>
+              </p:cTn>
+              <p:nextCondLst>
+                <p:cond evt="onClick" delay="0">
+                  <p:tgtEl>
+                    <p:spTgt spid="8"/>
+                  </p:tgtEl>
+                </p:cond>
+              </p:nextCondLst>
+            </p:seq>
+          </p:childTnLst>
+        </p:cTn>
       </p:par>
     </p:tnLst>
   </p:timing>
@@ -3976,7 +4083,15 @@
           <a:p>
             <a:r>
               <a:rPr lang="de-DE" dirty="0" smtClean="0"/>
-              <a:t>Für eventuelle Fragen stehen wir ihnen jetzt gerne zur Verfügung.</a:t>
+              <a:t>Für eventuelle Fragen stehen </a:t>
+            </a:r>
+            <a:r>
+              <a:rPr lang="de-DE" smtClean="0"/>
+              <a:t>wir Ihnen </a:t>
+            </a:r>
+            <a:r>
+              <a:rPr lang="de-DE" dirty="0" smtClean="0"/>
+              <a:t>jetzt gerne zur Verfügung.</a:t>
             </a:r>
             <a:endParaRPr lang="de-DE" dirty="0"/>
           </a:p>
@@ -4763,31 +4878,6 @@
       </p:sp>
       <p:sp>
         <p:nvSpPr>
-          <p:cNvPr id="3" name="Inhaltsplatzhalter 2"/>
-          <p:cNvSpPr>
-            <a:spLocks noGrp="1"/>
-          </p:cNvSpPr>
-          <p:nvPr>
-            <p:ph idx="1"/>
-          </p:nvPr>
-        </p:nvSpPr>
-        <p:spPr/>
-        <p:txBody>
-          <a:bodyPr/>
-          <a:lstStyle/>
-          <a:p>
-            <a:r>
-              <a:rPr lang="de-DE" dirty="0" smtClean="0"/>
-              <a:t>TODO Beispielvideo</a:t>
-            </a:r>
-          </a:p>
-          <a:p>
-            <a:endParaRPr lang="de-DE" dirty="0"/>
-          </a:p>
-        </p:txBody>
-      </p:sp>
-      <p:sp>
-        <p:nvSpPr>
           <p:cNvPr id="4" name="Datumsplatzhalter 3"/>
           <p:cNvSpPr>
             <a:spLocks noGrp="1"/>
@@ -4856,6 +4946,61 @@
           </a:p>
         </p:txBody>
       </p:sp>
+      <p:pic>
+        <p:nvPicPr>
+          <p:cNvPr id="7" name="Picture 2" descr="Cinema Display Diagonal blue icon"/>
+          <p:cNvPicPr>
+            <a:picLocks noChangeAspect="1" noChangeArrowheads="1"/>
+          </p:cNvPicPr>
+          <p:nvPr/>
+        </p:nvPicPr>
+        <p:blipFill>
+          <a:blip r:embed="rId3" cstate="print"/>
+          <a:srcRect/>
+          <a:stretch>
+            <a:fillRect/>
+          </a:stretch>
+        </p:blipFill>
+        <p:spPr bwMode="auto">
+          <a:xfrm>
+            <a:off x="3923928" y="2564904"/>
+            <a:ext cx="1219200" cy="1219201"/>
+          </a:xfrm>
+          <a:prstGeom prst="rect">
+            <a:avLst/>
+          </a:prstGeom>
+          <a:noFill/>
+        </p:spPr>
+      </p:pic>
+      <p:pic>
+        <p:nvPicPr>
+          <p:cNvPr id="8" name="tawusel.avi">
+            <a:hlinkClick r:id="" action="ppaction://media"/>
+          </p:cNvPr>
+          <p:cNvPicPr>
+            <a:picLocks noGrp="1" noRot="1" noChangeAspect="1"/>
+          </p:cNvPicPr>
+          <p:nvPr>
+            <p:ph idx="1"/>
+            <a:videoFile r:link="rId1"/>
+          </p:nvPr>
+        </p:nvPicPr>
+        <p:blipFill>
+          <a:blip r:embed="rId4" cstate="print"/>
+          <a:stretch>
+            <a:fillRect/>
+          </a:stretch>
+        </p:blipFill>
+        <p:spPr>
+          <a:xfrm>
+            <a:off x="50334" y="1268760"/>
+            <a:ext cx="9058170" cy="3960440"/>
+          </a:xfrm>
+          <a:prstGeom prst="rect">
+            <a:avLst/>
+          </a:prstGeom>
+        </p:spPr>
+      </p:pic>
     </p:spTree>
   </p:cSld>
   <p:clrMapOvr>
@@ -4864,7 +5009,150 @@
   <p:timing>
     <p:tnLst>
       <p:par>
-        <p:cTn id="1" dur="indefinite" restart="never" nodeType="tmRoot"/>
+        <p:cTn id="1" dur="indefinite" restart="never" nodeType="tmRoot">
+          <p:childTnLst>
+            <p:seq concurrent="1" nextAc="seek">
+              <p:cTn id="2" dur="indefinite" nodeType="mainSeq">
+                <p:childTnLst>
+                  <p:par>
+                    <p:cTn id="3" fill="hold">
+                      <p:stCondLst>
+                        <p:cond delay="indefinite"/>
+                        <p:cond evt="onBegin" delay="0">
+                          <p:tn val="2"/>
+                        </p:cond>
+                      </p:stCondLst>
+                      <p:childTnLst>
+                        <p:par>
+                          <p:cTn id="4" fill="hold">
+                            <p:stCondLst>
+                              <p:cond delay="0"/>
+                            </p:stCondLst>
+                            <p:childTnLst>
+                              <p:par>
+                                <p:cTn id="5" presetID="1" presetClass="mediacall" presetSubtype="0" fill="hold" nodeType="afterEffect">
+                                  <p:stCondLst>
+                                    <p:cond delay="0"/>
+                                  </p:stCondLst>
+                                  <p:childTnLst>
+                                    <p:cmd type="call" cmd="playFrom(0.0)">
+                                      <p:cBhvr>
+                                        <p:cTn id="6" dur="218960" fill="hold"/>
+                                        <p:tgtEl>
+                                          <p:spTgt spid="8"/>
+                                        </p:tgtEl>
+                                      </p:cBhvr>
+                                    </p:cmd>
+                                  </p:childTnLst>
+                                </p:cTn>
+                              </p:par>
+                            </p:childTnLst>
+                          </p:cTn>
+                        </p:par>
+                      </p:childTnLst>
+                    </p:cTn>
+                  </p:par>
+                </p:childTnLst>
+              </p:cTn>
+              <p:prevCondLst>
+                <p:cond evt="onPrev" delay="0">
+                  <p:tgtEl>
+                    <p:sldTgt/>
+                  </p:tgtEl>
+                </p:cond>
+              </p:prevCondLst>
+              <p:nextCondLst>
+                <p:cond evt="onNext" delay="0">
+                  <p:tgtEl>
+                    <p:sldTgt/>
+                  </p:tgtEl>
+                </p:cond>
+              </p:nextCondLst>
+            </p:seq>
+            <p:video>
+              <p:cMediaNode>
+                <p:cTn id="7" fill="hold" display="0">
+                  <p:stCondLst>
+                    <p:cond delay="indefinite"/>
+                  </p:stCondLst>
+                  <p:endCondLst>
+                    <p:cond evt="onNext" delay="0">
+                      <p:tgtEl>
+                        <p:sldTgt/>
+                      </p:tgtEl>
+                    </p:cond>
+                    <p:cond evt="onPrev" delay="0">
+                      <p:tgtEl>
+                        <p:sldTgt/>
+                      </p:tgtEl>
+                    </p:cond>
+                  </p:endCondLst>
+                </p:cTn>
+                <p:tgtEl>
+                  <p:spTgt spid="8"/>
+                </p:tgtEl>
+              </p:cMediaNode>
+            </p:video>
+            <p:seq concurrent="1" nextAc="seek">
+              <p:cTn id="8" restart="whenNotActive" fill="hold" evtFilter="cancelBubble" nodeType="interactiveSeq">
+                <p:stCondLst>
+                  <p:cond evt="onClick" delay="0">
+                    <p:tgtEl>
+                      <p:spTgt spid="8"/>
+                    </p:tgtEl>
+                  </p:cond>
+                </p:stCondLst>
+                <p:endSync evt="end" delay="0">
+                  <p:rtn val="all"/>
+                </p:endSync>
+                <p:childTnLst>
+                  <p:par>
+                    <p:cTn id="9" fill="hold">
+                      <p:stCondLst>
+                        <p:cond delay="0"/>
+                      </p:stCondLst>
+                      <p:childTnLst>
+                        <p:par>
+                          <p:cTn id="10" fill="hold">
+                            <p:stCondLst>
+                              <p:cond delay="0"/>
+                            </p:stCondLst>
+                            <p:childTnLst>
+                              <p:par>
+                                <p:cTn id="11" presetID="2" presetClass="mediacall" presetSubtype="0" fill="hold" nodeType="clickEffect">
+                                  <p:stCondLst>
+                                    <p:cond delay="0"/>
+                                  </p:stCondLst>
+                                  <p:childTnLst>
+                                    <p:cmd type="call" cmd="togglePause">
+                                      <p:cBhvr>
+                                        <p:cTn id="12" dur="1" fill="hold"/>
+                                        <p:tgtEl>
+                                          <p:spTgt spid="8"/>
+                                        </p:tgtEl>
+                                      </p:cBhvr>
+                                    </p:cmd>
+                                  </p:childTnLst>
+                                </p:cTn>
+                              </p:par>
+                            </p:childTnLst>
+                          </p:cTn>
+                        </p:par>
+                      </p:childTnLst>
+                    </p:cTn>
+                  </p:par>
+                </p:childTnLst>
+              </p:cTn>
+              <p:nextCondLst>
+                <p:cond evt="onClick" delay="0">
+                  <p:tgtEl>
+                    <p:spTgt spid="8"/>
+                  </p:tgtEl>
+                </p:cond>
+              </p:nextCondLst>
+            </p:seq>
+          </p:childTnLst>
+        </p:cTn>
       </p:par>
     </p:tnLst>
   </p:timing>
@@ -4933,29 +5221,6 @@
       </p:sp>
       <p:sp>
         <p:nvSpPr>
-          <p:cNvPr id="3" name="Inhaltsplatzhalter 2"/>
-          <p:cNvSpPr>
-            <a:spLocks noGrp="1"/>
-          </p:cNvSpPr>
-          <p:nvPr>
-            <p:ph idx="1"/>
-          </p:nvPr>
-        </p:nvSpPr>
-        <p:spPr/>
-        <p:txBody>
-          <a:bodyPr/>
-          <a:lstStyle/>
-          <a:p>
-            <a:r>
-              <a:rPr lang="de-DE" dirty="0" smtClean="0"/>
-              <a:t>TODO Beispielvideo</a:t>
-            </a:r>
-            <a:endParaRPr lang="de-DE" dirty="0"/>
-          </a:p>
-        </p:txBody>
-      </p:sp>
-      <p:sp>
-        <p:nvSpPr>
           <p:cNvPr id="4" name="Datumsplatzhalter 3"/>
           <p:cNvSpPr>
             <a:spLocks noGrp="1"/>
@@ -5024,6 +5289,61 @@
           </a:p>
         </p:txBody>
       </p:sp>
+      <p:pic>
+        <p:nvPicPr>
+          <p:cNvPr id="8194" name="Picture 2" descr="Cinema Display Diagonal blue icon"/>
+          <p:cNvPicPr>
+            <a:picLocks noChangeAspect="1" noChangeArrowheads="1"/>
+          </p:cNvPicPr>
+          <p:nvPr/>
+        </p:nvPicPr>
+        <p:blipFill>
+          <a:blip r:embed="rId3" cstate="print"/>
+          <a:srcRect/>
+          <a:stretch>
+            <a:fillRect/>
+          </a:stretch>
+        </p:blipFill>
+        <p:spPr bwMode="auto">
+          <a:xfrm>
+            <a:off x="3923928" y="2564904"/>
+            <a:ext cx="1219200" cy="1219201"/>
+          </a:xfrm>
+          <a:prstGeom prst="rect">
+            <a:avLst/>
+          </a:prstGeom>
+          <a:noFill/>
+        </p:spPr>
+      </p:pic>
+      <p:pic>
+        <p:nvPicPr>
+          <p:cNvPr id="8" name="tawusel-droid.avi">
+            <a:hlinkClick r:id="" action="ppaction://media"/>
+          </p:cNvPr>
+          <p:cNvPicPr>
+            <a:picLocks noGrp="1" noRot="1" noChangeAspect="1"/>
+          </p:cNvPicPr>
+          <p:nvPr>
+            <p:ph idx="1"/>
+            <a:videoFile r:link="rId1"/>
+          </p:nvPr>
+        </p:nvPicPr>
+        <p:blipFill>
+          <a:blip r:embed="rId4" cstate="print"/>
+          <a:stretch>
+            <a:fillRect/>
+          </a:stretch>
+        </p:blipFill>
+        <p:spPr>
+          <a:xfrm>
+            <a:off x="2843808" y="836712"/>
+            <a:ext cx="3405178" cy="5472608"/>
+          </a:xfrm>
+          <a:prstGeom prst="rect">
+            <a:avLst/>
+          </a:prstGeom>
+        </p:spPr>
+      </p:pic>
     </p:spTree>
   </p:cSld>
   <p:clrMapOvr>
@@ -5032,7 +5352,150 @@
   <p:timing>
     <p:tnLst>
       <p:par>
-        <p:cTn id="1" dur="indefinite" restart="never" nodeType="tmRoot"/>
+        <p:cTn id="1" dur="indefinite" restart="never" nodeType="tmRoot">
+          <p:childTnLst>
+            <p:seq concurrent="1" nextAc="seek">
+              <p:cTn id="2" dur="indefinite" nodeType="mainSeq">
+                <p:childTnLst>
+                  <p:par>
+                    <p:cTn id="3" fill="hold">
+                      <p:stCondLst>
+                        <p:cond delay="indefinite"/>
+                        <p:cond evt="onBegin" delay="0">
+                          <p:tn val="2"/>
+                        </p:cond>
+                      </p:stCondLst>
+                      <p:childTnLst>
+                        <p:par>
+                          <p:cTn id="4" fill="hold">
+                            <p:stCondLst>
+                              <p:cond delay="0"/>
+                            </p:stCondLst>
+                            <p:childTnLst>
+                              <p:par>
+                                <p:cTn id="5" presetID="1" presetClass="mediacall" presetSubtype="0" fill="hold" nodeType="afterEffect">
+                                  <p:stCondLst>
+                                    <p:cond delay="0"/>
+                                  </p:stCondLst>
+                                  <p:childTnLst>
+                                    <p:cmd type="call" cmd="playFrom(0.0)">
+                                      <p:cBhvr>
+                                        <p:cTn id="6" dur="101200" fill="hold"/>
+                                        <p:tgtEl>
+                                          <p:spTgt spid="8"/>
+                                        </p:tgtEl>
+                                      </p:cBhvr>
+                                    </p:cmd>
+                                  </p:childTnLst>
+                                </p:cTn>
+                              </p:par>
+                            </p:childTnLst>
+                          </p:cTn>
+                        </p:par>
+                      </p:childTnLst>
+                    </p:cTn>
+                  </p:par>
+                </p:childTnLst>
+              </p:cTn>
+              <p:prevCondLst>
+                <p:cond evt="onPrev" delay="0">
+                  <p:tgtEl>
+                    <p:sldTgt/>
+                  </p:tgtEl>
+                </p:cond>
+              </p:prevCondLst>
+              <p:nextCondLst>
+                <p:cond evt="onNext" delay="0">
+                  <p:tgtEl>
+                    <p:sldTgt/>
+                  </p:tgtEl>
+                </p:cond>
+              </p:nextCondLst>
+            </p:seq>
+            <p:video>
+              <p:cMediaNode>
+                <p:cTn id="7" fill="hold" display="0">
+                  <p:stCondLst>
+                    <p:cond delay="indefinite"/>
+                  </p:stCondLst>
+                  <p:endCondLst>
+                    <p:cond evt="onNext" delay="0">
+                      <p:tgtEl>
+                        <p:sldTgt/>
+                      </p:tgtEl>
+                    </p:cond>
+                    <p:cond evt="onPrev" delay="0">
+                      <p:tgtEl>
+                        <p:sldTgt/>
+                      </p:tgtEl>
+                    </p:cond>
+                  </p:endCondLst>
+                </p:cTn>
+                <p:tgtEl>
+                  <p:spTgt spid="8"/>
+                </p:tgtEl>
+              </p:cMediaNode>
+            </p:video>
+            <p:seq concurrent="1" nextAc="seek">
+              <p:cTn id="8" restart="whenNotActive" fill="hold" evtFilter="cancelBubble" nodeType="interactiveSeq">
+                <p:stCondLst>
+                  <p:cond evt="onClick" delay="0">
+                    <p:tgtEl>
+                      <p:spTgt spid="8"/>
+                    </p:tgtEl>
+                  </p:cond>
+                </p:stCondLst>
+                <p:endSync evt="end" delay="0">
+                  <p:rtn val="all"/>
+                </p:endSync>
+                <p:childTnLst>
+                  <p:par>
+                    <p:cTn id="9" fill="hold">
+                      <p:stCondLst>
+                        <p:cond delay="0"/>
+                      </p:stCondLst>
+                      <p:childTnLst>
+                        <p:par>
+                          <p:cTn id="10" fill="hold">
+                            <p:stCondLst>
+                              <p:cond delay="0"/>
+                            </p:stCondLst>
+                            <p:childTnLst>
+                              <p:par>
+                                <p:cTn id="11" presetID="2" presetClass="mediacall" presetSubtype="0" fill="hold" nodeType="clickEffect">
+                                  <p:stCondLst>
+                                    <p:cond delay="0"/>
+                                  </p:stCondLst>
+                                  <p:childTnLst>
+                                    <p:cmd type="call" cmd="togglePause">
+                                      <p:cBhvr>
+                                        <p:cTn id="12" dur="1" fill="hold"/>
+                                        <p:tgtEl>
+                                          <p:spTgt spid="8"/>
+                                        </p:tgtEl>
+                                      </p:cBhvr>
+                                    </p:cmd>
+                                  </p:childTnLst>
+                                </p:cTn>
+                              </p:par>
+                            </p:childTnLst>
+                          </p:cTn>
+                        </p:par>
+                      </p:childTnLst>
+                    </p:cTn>
+                  </p:par>
+                </p:childTnLst>
+              </p:cTn>
+              <p:nextCondLst>
+                <p:cond evt="onClick" delay="0">
+                  <p:tgtEl>
+                    <p:spTgt spid="8"/>
+                  </p:tgtEl>
+                </p:cond>
+              </p:nextCondLst>
+            </p:seq>
+          </p:childTnLst>
+        </p:cTn>
       </p:par>
     </p:tnLst>
   </p:timing>
@@ -6301,8 +6764,27 @@
             </a:r>
             <a:r>
               <a:rPr lang="de-DE" dirty="0" smtClean="0"/>
-              <a:t> für das anbieten einer Mitfahrgelegenheit</a:t>
-            </a:r>
+              <a:t> für das anbieten einer </a:t>
+            </a:r>
+            <a:r>
+              <a:rPr lang="de-DE" dirty="0" smtClean="0"/>
+              <a:t>Mitfahrgelegenheit</a:t>
+            </a:r>
+          </a:p>
+          <a:p>
+            <a:r>
+              <a:rPr lang="de-DE" dirty="0" err="1" smtClean="0"/>
+              <a:t>CarMob</a:t>
+            </a:r>
+            <a:endParaRPr lang="de-DE" dirty="0" smtClean="0"/>
+          </a:p>
+          <a:p>
+            <a:pPr lvl="1"/>
+            <a:r>
+              <a:rPr lang="de-DE" dirty="0" smtClean="0"/>
+              <a:t>Taxifahrt automatisch eintragen</a:t>
+            </a:r>
+            <a:endParaRPr lang="de-DE" dirty="0" smtClean="0"/>
           </a:p>
           <a:p>
             <a:endParaRPr lang="de-DE" dirty="0"/>

</xml_diff>